<commit_message>
fix: [graph] removed piechart and Addded Doughnut Chart
</commit_message>
<xml_diff>
--- a/my-presentation.pptx
+++ b/my-presentation.pptx
@@ -109,7 +109,7 @@
 </p:presentation>
 </file>
 
-<file path=ppt/charts/chart4.xml><?xml version="1.0" encoding="utf-8"?>
+<file path=ppt/charts/chart1.xml><?xml version="1.0" encoding="utf-8"?>
 <c:chartSpace xmlns:c="http://schemas.openxmlformats.org/drawingml/2006/chart" xmlns:a="http://schemas.openxmlformats.org/drawingml/2006/main" xmlns:r="http://schemas.openxmlformats.org/officeDocument/2006/relationships">
   <c:date1904 val="0"/>
   <c:roundedCorners val="1"/>
@@ -443,7 +443,7 @@
 </c:chartSpace>
 </file>
 
-<file path=ppt/charts/chart5.xml><?xml version="1.0" encoding="utf-8"?>
+<file path=ppt/charts/chart2.xml><?xml version="1.0" encoding="utf-8"?>
 <c:chartSpace xmlns:c="http://schemas.openxmlformats.org/drawingml/2006/chart" xmlns:a="http://schemas.openxmlformats.org/drawingml/2006/main" xmlns:r="http://schemas.openxmlformats.org/officeDocument/2006/relationships">
   <c:date1904 val="0"/>
   <c:roundedCorners val="1"/>
@@ -683,7 +683,7 @@
 </c:chartSpace>
 </file>
 
-<file path=ppt/charts/chart6.xml><?xml version="1.0" encoding="utf-8"?>
+<file path=ppt/charts/chart3.xml><?xml version="1.0" encoding="utf-8"?>
 <c:chartSpace xmlns:c="http://schemas.openxmlformats.org/drawingml/2006/chart" xmlns:a="http://schemas.openxmlformats.org/drawingml/2006/main" xmlns:r="http://schemas.openxmlformats.org/officeDocument/2006/relationships">
   <c:date1904 val="0"/>
   <c:roundedCorners val="1"/>
@@ -720,7 +720,7 @@
     <c:autoTitleDeleted val="0"/>
     <c:plotArea>
       <c:layout/>
-      <c:pieChart>
+      <c:doughnutChart>
         <c:varyColors val="1"/>
         <c:ser>
           <c:idx val="0"/>
@@ -933,7 +933,6 @@
                 </a:pPr>
               </a:p>
             </c:txPr>
-            <c:dLblPos val="ctr"/>
             <c:showLegendKey val="0"/>
             <c:showVal val="0"/>
             <c:showCatName val="1"/>
@@ -984,7 +983,8 @@
           </c:val>
         </c:ser>
         <c:firstSliceAng val="0"/>
-      </c:pieChart>
+        <c:holeSize val="80"/>
+      </c:doughnutChart>
       <c:spPr>
         <a:noFill/>
         <a:ln>

</xml_diff>